<commit_message>
Changed to non-dominant and to the arms
</commit_message>
<xml_diff>
--- a/docs/painEffort/Images.pptx
+++ b/docs/painEffort/Images.pptx
@@ -216,7 +216,7 @@
           <a:p>
             <a:fld id="{9F7F45FB-75A5-47E5-A5D3-1A5C5DE59649}" type="datetimeFigureOut">
               <a:rPr lang="en-DK" smtClean="0"/>
-              <a:t>14/04/2024</a:t>
+              <a:t>16/04/2024</a:t>
             </a:fld>
             <a:endParaRPr lang="en-DK"/>
           </a:p>
@@ -2035,7 +2035,7 @@
           <a:p>
             <a:fld id="{D62FBA41-FAD5-4E12-AD08-A393780C2589}" type="datetimeFigureOut">
               <a:rPr lang="en-GB" smtClean="0"/>
-              <a:t>14/04/2024</a:t>
+              <a:t>16/04/2024</a:t>
             </a:fld>
             <a:endParaRPr lang="en-GB"/>
           </a:p>
@@ -2257,7 +2257,7 @@
           <a:p>
             <a:fld id="{D62FBA41-FAD5-4E12-AD08-A393780C2589}" type="datetimeFigureOut">
               <a:rPr lang="en-GB" smtClean="0"/>
-              <a:t>14/04/2024</a:t>
+              <a:t>16/04/2024</a:t>
             </a:fld>
             <a:endParaRPr lang="en-GB"/>
           </a:p>
@@ -2370,7 +2370,7 @@
           <a:p>
             <a:fld id="{B3C54930-DF73-4683-BEE7-FFCD5ED63EE6}" type="datetimeFigureOut">
               <a:rPr lang="en-DK" smtClean="0"/>
-              <a:t>14/04/2024</a:t>
+              <a:t>16/04/2024</a:t>
             </a:fld>
             <a:endParaRPr lang="en-DK"/>
           </a:p>
@@ -3268,7 +3268,7 @@
         <p:spPr>
           <a:xfrm>
             <a:off x="3156251" y="1082371"/>
-            <a:ext cx="5879495" cy="646331"/>
+            <a:ext cx="6085256" cy="646331"/>
           </a:xfrm>
           <a:prstGeom prst="rect">
             <a:avLst/>
@@ -3283,7 +3283,7 @@
           <a:p>
             <a:r>
               <a:rPr lang="en-GB" sz="3600" dirty="0"/>
-              <a:t>RATE PAIN IN YOUR RIGHT LEG</a:t>
+              <a:t>RATE PAIN IN YOUR RIGHT ARM</a:t>
             </a:r>
             <a:endParaRPr lang="en-DK" sz="3600" dirty="0"/>
           </a:p>
@@ -3381,7 +3381,7 @@
         <p:spPr>
           <a:xfrm>
             <a:off x="3313347" y="1082371"/>
-            <a:ext cx="5565306" cy="646331"/>
+            <a:ext cx="5771067" cy="646331"/>
           </a:xfrm>
           <a:prstGeom prst="rect">
             <a:avLst/>
@@ -3396,7 +3396,7 @@
           <a:p>
             <a:r>
               <a:rPr lang="en-GB" sz="3600" dirty="0"/>
-              <a:t>RATE PAIN IN YOUR LEFT LEG</a:t>
+              <a:t>RATE PAIN IN YOUR LEFT ARM</a:t>
             </a:r>
             <a:endParaRPr lang="en-DK" sz="3600" dirty="0"/>
           </a:p>
@@ -3547,7 +3547,7 @@
                 <a:ea typeface="Times New Roman" panose="02020603050405020304" pitchFamily="18" charset="0"/>
                 <a:cs typeface="Times New Roman" panose="02020603050405020304" pitchFamily="18" charset="0"/>
               </a:rPr>
-              <a:t>Dominant Leg</a:t>
+              <a:t>Non-Dominant Arm</a:t>
             </a:r>
             <a:endParaRPr lang="en-DK" sz="1200" kern="100" dirty="0">
               <a:effectLst/>
@@ -3622,7 +3622,7 @@
                 <a:ea typeface="Times New Roman" panose="02020603050405020304" pitchFamily="18" charset="0"/>
                 <a:cs typeface="Times New Roman" panose="02020603050405020304" pitchFamily="18" charset="0"/>
               </a:rPr>
-              <a:t>In this test, the pressure on the cuff on your dominant leg will gradually increase. I would like you to rate the pressure sensation with the scale in your hand. The scale goes from </a:t>
+              <a:t>In this test, the pressure on the cuff on your non-dominant arm will gradually increase. I would like you to rate the pressure sensation with the scale in your hand. The scale goes from </a:t>
             </a:r>
             <a:r>
               <a:rPr lang="en-GB" sz="2800" b="1" kern="100" dirty="0">
@@ -3767,7 +3767,7 @@
                 <a:ea typeface="Times New Roman" panose="02020603050405020304" pitchFamily="18" charset="0"/>
                 <a:cs typeface="Times New Roman" panose="02020603050405020304" pitchFamily="18" charset="0"/>
               </a:rPr>
-              <a:t>Non-Dominant Leg</a:t>
+              <a:t>Dominant Arm</a:t>
             </a:r>
             <a:endParaRPr lang="en-DK" sz="1200" kern="100" dirty="0">
               <a:effectLst/>
@@ -3842,7 +3842,7 @@
                 <a:ea typeface="Times New Roman" panose="02020603050405020304" pitchFamily="18" charset="0"/>
                 <a:cs typeface="Times New Roman" panose="02020603050405020304" pitchFamily="18" charset="0"/>
               </a:rPr>
-              <a:t>In this test, the pressure on the cuff on your non-dominant leg will gradually increase. I would like you to rate the pressure sensation with the scale in your hand. Please rate this pressure sensation in the same way as before.</a:t>
+              <a:t>In this test, the pressure on the cuff on your dominant arm will gradually increase. I would like you to rate the pressure sensation with the scale in your hand. Please rate this pressure sensation in the same way as before.</a:t>
             </a:r>
             <a:endParaRPr lang="en-DK" sz="1200" kern="100" dirty="0">
               <a:effectLst/>
@@ -4326,7 +4326,7 @@
                 <a:ea typeface="Times New Roman" panose="02020603050405020304" pitchFamily="18" charset="0"/>
                 <a:cs typeface="Times New Roman" panose="02020603050405020304" pitchFamily="18" charset="0"/>
               </a:rPr>
-              <a:t>In this test you will feel an intense painful pressure squeeze on your non-dominant leg while the pressure on the cuff on your dominant leg will gradually increase. I would like you to rate the pain you feel on the dominant leg only with the scale in your hand. The scale goes from </a:t>
+              <a:t>In this test you will feel an intense painful pressure squeeze on your dominant arm while the pressure on the cuff on your non-dominant leg will gradually increase. I would like you to rate the pain you feel on the non-dominant arm only with the scale in your hand. The scale goes from </a:t>
             </a:r>
             <a:r>
               <a:rPr lang="en-GB" sz="2800" b="1" kern="100" dirty="0">

</xml_diff>

<commit_message>
Updates Images for the Pain Effort Protocol
</commit_message>
<xml_diff>
--- a/docs/painEffort/Images.pptx
+++ b/docs/painEffort/Images.pptx
@@ -216,7 +216,7 @@
           <a:p>
             <a:fld id="{9F7F45FB-75A5-47E5-A5D3-1A5C5DE59649}" type="datetimeFigureOut">
               <a:rPr lang="en-DK" smtClean="0"/>
-              <a:t>16/04/2024</a:t>
+              <a:t>08/20/2024</a:t>
             </a:fld>
             <a:endParaRPr lang="en-DK"/>
           </a:p>
@@ -2035,7 +2035,7 @@
           <a:p>
             <a:fld id="{D62FBA41-FAD5-4E12-AD08-A393780C2589}" type="datetimeFigureOut">
               <a:rPr lang="en-GB" smtClean="0"/>
-              <a:t>16/04/2024</a:t>
+              <a:t>20/08/2024</a:t>
             </a:fld>
             <a:endParaRPr lang="en-GB"/>
           </a:p>
@@ -2257,7 +2257,7 @@
           <a:p>
             <a:fld id="{D62FBA41-FAD5-4E12-AD08-A393780C2589}" type="datetimeFigureOut">
               <a:rPr lang="en-GB" smtClean="0"/>
-              <a:t>16/04/2024</a:t>
+              <a:t>20/08/2024</a:t>
             </a:fld>
             <a:endParaRPr lang="en-GB"/>
           </a:p>
@@ -2370,7 +2370,7 @@
           <a:p>
             <a:fld id="{B3C54930-DF73-4683-BEE7-FFCD5ED63EE6}" type="datetimeFigureOut">
               <a:rPr lang="en-DK" smtClean="0"/>
-              <a:t>16/04/2024</a:t>
+              <a:t>08/20/2024</a:t>
             </a:fld>
             <a:endParaRPr lang="en-DK"/>
           </a:p>
@@ -3267,8 +3267,8 @@
         </p:nvSpPr>
         <p:spPr>
           <a:xfrm>
-            <a:off x="3156251" y="1082371"/>
-            <a:ext cx="6085256" cy="646331"/>
+            <a:off x="2646498" y="1082371"/>
+            <a:ext cx="6899005" cy="1508105"/>
           </a:xfrm>
           <a:prstGeom prst="rect">
             <a:avLst/>
@@ -3283,8 +3283,18 @@
           <a:p>
             <a:r>
               <a:rPr lang="en-GB" sz="3600" dirty="0"/>
-              <a:t>RATE PAIN IN YOUR RIGHT ARM</a:t>
-            </a:r>
+              <a:t>RATE PAIN IN YOUR DOMINANT LEG</a:t>
+            </a:r>
+          </a:p>
+          <a:p>
+            <a:pPr algn="ctr"/>
+            <a:r>
+              <a:rPr lang="en-GB" dirty="0"/>
+              <a:t>(THE ONE YOU ARE TRYING TO EXTEND)</a:t>
+            </a:r>
+            <a:endParaRPr lang="en-DK" dirty="0"/>
+          </a:p>
+          <a:p>
             <a:endParaRPr lang="en-DK" sz="3600" dirty="0"/>
           </a:p>
         </p:txBody>
@@ -3380,8 +3390,8 @@
         </p:nvSpPr>
         <p:spPr>
           <a:xfrm>
-            <a:off x="3313347" y="1082371"/>
-            <a:ext cx="5771067" cy="646331"/>
+            <a:off x="2124721" y="1082371"/>
+            <a:ext cx="7942559" cy="954107"/>
           </a:xfrm>
           <a:prstGeom prst="rect">
             <a:avLst/>
@@ -3396,9 +3406,16 @@
           <a:p>
             <a:r>
               <a:rPr lang="en-GB" sz="3600" dirty="0"/>
-              <a:t>RATE PAIN IN YOUR LEFT ARM</a:t>
-            </a:r>
-            <a:endParaRPr lang="en-DK" sz="3600" dirty="0"/>
+              <a:t>RATE PAIN IN YOUR NON-DOMINANT LEG</a:t>
+            </a:r>
+          </a:p>
+          <a:p>
+            <a:pPr algn="ctr"/>
+            <a:r>
+              <a:rPr lang="en-GB" dirty="0"/>
+              <a:t>(THE ONE WITH THE CUFF ON)</a:t>
+            </a:r>
+            <a:endParaRPr lang="en-DK" dirty="0"/>
           </a:p>
         </p:txBody>
       </p:sp>
@@ -3494,7 +3511,7 @@
         <p:spPr>
           <a:xfrm>
             <a:off x="944137" y="586331"/>
-            <a:ext cx="10303726" cy="5685339"/>
+            <a:ext cx="10303726" cy="5985549"/>
           </a:xfrm>
           <a:prstGeom prst="rect">
             <a:avLst/>
@@ -3547,7 +3564,7 @@
                 <a:ea typeface="Times New Roman" panose="02020603050405020304" pitchFamily="18" charset="0"/>
                 <a:cs typeface="Times New Roman" panose="02020603050405020304" pitchFamily="18" charset="0"/>
               </a:rPr>
-              <a:t>Non-Dominant Arm</a:t>
+              <a:t>Non-Dominant Leg</a:t>
             </a:r>
             <a:endParaRPr lang="en-DK" sz="1200" kern="100" dirty="0">
               <a:effectLst/>
@@ -3597,17 +3614,19 @@
                 <a:ea typeface="Times New Roman" panose="02020603050405020304" pitchFamily="18" charset="0"/>
                 <a:cs typeface="Times New Roman" panose="02020603050405020304" pitchFamily="18" charset="0"/>
               </a:rPr>
-              <a:t>Instructions to the subject</a:t>
-            </a:r>
-            <a:endParaRPr lang="en-DK" sz="1200" kern="100" dirty="0">
-              <a:effectLst/>
-              <a:latin typeface="Calibri" panose="020F0502020204030204" pitchFamily="34" charset="0"/>
-              <a:ea typeface="Times New Roman" panose="02020603050405020304" pitchFamily="18" charset="0"/>
-              <a:cs typeface="Times New Roman" panose="02020603050405020304" pitchFamily="18" charset="0"/>
-            </a:endParaRPr>
-          </a:p>
-          <a:p>
-            <a:pPr>
+              <a:t>Instructions to the </a:t>
+            </a:r>
+            <a:r>
+              <a:rPr lang="en-GB" sz="2800" b="1" kern="100" dirty="0">
+                <a:latin typeface="Calibri" panose="020F0502020204030204" pitchFamily="34" charset="0"/>
+                <a:ea typeface="Times New Roman" panose="02020603050405020304" pitchFamily="18" charset="0"/>
+                <a:cs typeface="Times New Roman" panose="02020603050405020304" pitchFamily="18" charset="0"/>
+              </a:rPr>
+              <a:t>participant</a:t>
+            </a:r>
+          </a:p>
+          <a:p>
+            <a:pPr algn="ctr">
               <a:lnSpc>
                 <a:spcPct val="107000"/>
               </a:lnSpc>
@@ -3615,6 +3634,22 @@
                 <a:spcPts val="800"/>
               </a:spcAft>
             </a:pPr>
+            <a:endParaRPr lang="en-DK" sz="1200" kern="100" dirty="0">
+              <a:effectLst/>
+              <a:latin typeface="Calibri" panose="020F0502020204030204" pitchFamily="34" charset="0"/>
+              <a:ea typeface="Times New Roman" panose="02020603050405020304" pitchFamily="18" charset="0"/>
+              <a:cs typeface="Times New Roman" panose="02020603050405020304" pitchFamily="18" charset="0"/>
+            </a:endParaRPr>
+          </a:p>
+          <a:p>
+            <a:pPr algn="just">
+              <a:lnSpc>
+                <a:spcPct val="107000"/>
+              </a:lnSpc>
+              <a:spcAft>
+                <a:spcPts val="800"/>
+              </a:spcAft>
+            </a:pPr>
             <a:r>
               <a:rPr lang="en-GB" sz="2800" kern="100" dirty="0">
                 <a:effectLst/>
@@ -3622,7 +3657,24 @@
                 <a:ea typeface="Times New Roman" panose="02020603050405020304" pitchFamily="18" charset="0"/>
                 <a:cs typeface="Times New Roman" panose="02020603050405020304" pitchFamily="18" charset="0"/>
               </a:rPr>
-              <a:t>In this test, the pressure on the cuff on your non-dominant arm will gradually increase. I would like you to rate the pressure sensation with the scale in your hand. The scale goes from </a:t>
+              <a:t>In this test, the pressure on the cuff on your non-dominant </a:t>
+            </a:r>
+            <a:r>
+              <a:rPr lang="en-GB" sz="2800" kern="100" dirty="0">
+                <a:latin typeface="Calibri" panose="020F0502020204030204" pitchFamily="34" charset="0"/>
+                <a:ea typeface="Times New Roman" panose="02020603050405020304" pitchFamily="18" charset="0"/>
+                <a:cs typeface="Times New Roman" panose="02020603050405020304" pitchFamily="18" charset="0"/>
+              </a:rPr>
+              <a:t>leg</a:t>
+            </a:r>
+            <a:r>
+              <a:rPr lang="en-GB" sz="2800" kern="100" dirty="0">
+                <a:effectLst/>
+                <a:latin typeface="Calibri" panose="020F0502020204030204" pitchFamily="34" charset="0"/>
+                <a:ea typeface="Times New Roman" panose="02020603050405020304" pitchFamily="18" charset="0"/>
+                <a:cs typeface="Times New Roman" panose="02020603050405020304" pitchFamily="18" charset="0"/>
+              </a:rPr>
+              <a:t> will gradually increase. I would like you to rate the pressure sensation with the scale in your hand. The scale goes from </a:t>
             </a:r>
             <a:r>
               <a:rPr lang="en-GB" sz="2800" b="1" kern="100" dirty="0">
@@ -3640,7 +3692,7 @@
                 <a:ea typeface="Times New Roman" panose="02020603050405020304" pitchFamily="18" charset="0"/>
                 <a:cs typeface="Times New Roman" panose="02020603050405020304" pitchFamily="18" charset="0"/>
               </a:rPr>
-              <a:t> to </a:t>
+              <a:t> (left) to </a:t>
             </a:r>
             <a:r>
               <a:rPr lang="en-GB" sz="2800" b="1" kern="100" dirty="0">
@@ -3649,7 +3701,7 @@
                 <a:ea typeface="Times New Roman" panose="02020603050405020304" pitchFamily="18" charset="0"/>
                 <a:cs typeface="Times New Roman" panose="02020603050405020304" pitchFamily="18" charset="0"/>
               </a:rPr>
-              <a:t>Maximal Pain</a:t>
+              <a:t>Maximal Pain </a:t>
             </a:r>
             <a:r>
               <a:rPr lang="en-GB" sz="2800" kern="100" dirty="0">
@@ -3658,7 +3710,7 @@
                 <a:ea typeface="Times New Roman" panose="02020603050405020304" pitchFamily="18" charset="0"/>
                 <a:cs typeface="Times New Roman" panose="02020603050405020304" pitchFamily="18" charset="0"/>
               </a:rPr>
-              <a:t>. When you rate the pain, it is important that you start rating the moment you feel the slightest hint of pain. The Maximal Pain is the worst pain you can endure and when you reach this level the pressure will automatically stop.</a:t>
+              <a:t>(right). When you rate the pain, it is important that you start rating the moment you feel the slightest hint of pain. The Maximal Pain is the worst pain you can endure and when you reach this level, the pressure will automatically stop.</a:t>
             </a:r>
             <a:endParaRPr lang="en-DK" sz="1200" kern="100" dirty="0">
               <a:effectLst/>
@@ -3714,7 +3766,7 @@
         <p:spPr>
           <a:xfrm>
             <a:off x="827049" y="847973"/>
-            <a:ext cx="10537903" cy="5162054"/>
+            <a:ext cx="10537903" cy="5741444"/>
           </a:xfrm>
           <a:prstGeom prst="rect">
             <a:avLst/>
@@ -3767,7 +3819,7 @@
                 <a:ea typeface="Times New Roman" panose="02020603050405020304" pitchFamily="18" charset="0"/>
                 <a:cs typeface="Times New Roman" panose="02020603050405020304" pitchFamily="18" charset="0"/>
               </a:rPr>
-              <a:t>Dominant Arm</a:t>
+              <a:t>Dominant Leg</a:t>
             </a:r>
             <a:endParaRPr lang="en-DK" sz="1200" kern="100" dirty="0">
               <a:effectLst/>
@@ -3817,7 +3869,7 @@
                 <a:ea typeface="Times New Roman" panose="02020603050405020304" pitchFamily="18" charset="0"/>
                 <a:cs typeface="Times New Roman" panose="02020603050405020304" pitchFamily="18" charset="0"/>
               </a:rPr>
-              <a:t>Instructions to the subject</a:t>
+              <a:t>Instructions to the participant</a:t>
             </a:r>
             <a:endParaRPr lang="en-DK" sz="1200" kern="100" dirty="0">
               <a:effectLst/>
@@ -3835,6 +3887,22 @@
                 <a:spcPts val="800"/>
               </a:spcAft>
             </a:pPr>
+            <a:endParaRPr lang="en-GB" sz="2800" kern="100" dirty="0">
+              <a:effectLst/>
+              <a:latin typeface="Calibri" panose="020F0502020204030204" pitchFamily="34" charset="0"/>
+              <a:ea typeface="Times New Roman" panose="02020603050405020304" pitchFamily="18" charset="0"/>
+              <a:cs typeface="Times New Roman" panose="02020603050405020304" pitchFamily="18" charset="0"/>
+            </a:endParaRPr>
+          </a:p>
+          <a:p>
+            <a:pPr>
+              <a:lnSpc>
+                <a:spcPct val="107000"/>
+              </a:lnSpc>
+              <a:spcAft>
+                <a:spcPts val="800"/>
+              </a:spcAft>
+            </a:pPr>
             <a:r>
               <a:rPr lang="en-GB" sz="2800" kern="100" dirty="0">
                 <a:effectLst/>
@@ -3842,7 +3910,60 @@
                 <a:ea typeface="Times New Roman" panose="02020603050405020304" pitchFamily="18" charset="0"/>
                 <a:cs typeface="Times New Roman" panose="02020603050405020304" pitchFamily="18" charset="0"/>
               </a:rPr>
-              <a:t>In this test, the pressure on the cuff on your dominant arm will gradually increase. I would like you to rate the pressure sensation with the scale in your hand. Please rate this pressure sensation in the same way as before.</a:t>
+              <a:t>In this test, the pressure on the cuff on your dominant </a:t>
+            </a:r>
+            <a:r>
+              <a:rPr lang="en-GB" sz="2800" kern="100" dirty="0">
+                <a:latin typeface="Calibri" panose="020F0502020204030204" pitchFamily="34" charset="0"/>
+                <a:ea typeface="Times New Roman" panose="02020603050405020304" pitchFamily="18" charset="0"/>
+                <a:cs typeface="Times New Roman" panose="02020603050405020304" pitchFamily="18" charset="0"/>
+              </a:rPr>
+              <a:t>leg</a:t>
+            </a:r>
+            <a:r>
+              <a:rPr lang="en-GB" sz="2800" kern="100" dirty="0">
+                <a:effectLst/>
+                <a:latin typeface="Calibri" panose="020F0502020204030204" pitchFamily="34" charset="0"/>
+                <a:ea typeface="Times New Roman" panose="02020603050405020304" pitchFamily="18" charset="0"/>
+                <a:cs typeface="Times New Roman" panose="02020603050405020304" pitchFamily="18" charset="0"/>
+              </a:rPr>
+              <a:t> will gradually increase. I would like you to rate your perception of pain with the scale in your hand. Please rate this pain in the same way as previous tests ranging from </a:t>
+            </a:r>
+            <a:r>
+              <a:rPr lang="en-GB" sz="2800" b="1" kern="100" dirty="0">
+                <a:effectLst/>
+                <a:latin typeface="Calibri" panose="020F0502020204030204" pitchFamily="34" charset="0"/>
+                <a:ea typeface="Times New Roman" panose="02020603050405020304" pitchFamily="18" charset="0"/>
+                <a:cs typeface="Times New Roman" panose="02020603050405020304" pitchFamily="18" charset="0"/>
+              </a:rPr>
+              <a:t>No Pain </a:t>
+            </a:r>
+            <a:r>
+              <a:rPr lang="en-GB" sz="2800" kern="100" dirty="0">
+                <a:effectLst/>
+                <a:latin typeface="Calibri" panose="020F0502020204030204" pitchFamily="34" charset="0"/>
+                <a:ea typeface="Times New Roman" panose="02020603050405020304" pitchFamily="18" charset="0"/>
+                <a:cs typeface="Times New Roman" panose="02020603050405020304" pitchFamily="18" charset="0"/>
+              </a:rPr>
+              <a:t>(left) to </a:t>
+            </a:r>
+            <a:r>
+              <a:rPr lang="en-GB" sz="2800" b="1" kern="100" dirty="0">
+                <a:effectLst/>
+                <a:latin typeface="Calibri" panose="020F0502020204030204" pitchFamily="34" charset="0"/>
+                <a:ea typeface="Times New Roman" panose="02020603050405020304" pitchFamily="18" charset="0"/>
+                <a:cs typeface="Times New Roman" panose="02020603050405020304" pitchFamily="18" charset="0"/>
+              </a:rPr>
+              <a:t>Maximal Pain </a:t>
+            </a:r>
+            <a:r>
+              <a:rPr lang="en-GB" sz="2800" kern="100" dirty="0">
+                <a:effectLst/>
+                <a:latin typeface="Calibri" panose="020F0502020204030204" pitchFamily="34" charset="0"/>
+                <a:ea typeface="Times New Roman" panose="02020603050405020304" pitchFamily="18" charset="0"/>
+                <a:cs typeface="Times New Roman" panose="02020603050405020304" pitchFamily="18" charset="0"/>
+              </a:rPr>
+              <a:t>(right).</a:t>
             </a:r>
             <a:endParaRPr lang="en-DK" sz="1200" kern="100" dirty="0">
               <a:effectLst/>
@@ -3948,7 +4069,7 @@
         <p:spPr>
           <a:xfrm>
             <a:off x="938561" y="391887"/>
-            <a:ext cx="10314878" cy="6074227"/>
+            <a:ext cx="10314878" cy="5882893"/>
           </a:xfrm>
           <a:prstGeom prst="rect">
             <a:avLst/>
@@ -4026,17 +4147,11 @@
                 <a:ea typeface="Times New Roman" panose="02020603050405020304" pitchFamily="18" charset="0"/>
                 <a:cs typeface="Times New Roman" panose="02020603050405020304" pitchFamily="18" charset="0"/>
               </a:rPr>
-              <a:t>Instructions the subject</a:t>
-            </a:r>
-            <a:endParaRPr lang="en-DK" sz="1400" kern="100" dirty="0">
-              <a:effectLst/>
-              <a:latin typeface="Calibri" panose="020F0502020204030204" pitchFamily="34" charset="0"/>
-              <a:ea typeface="Times New Roman" panose="02020603050405020304" pitchFamily="18" charset="0"/>
-              <a:cs typeface="Times New Roman" panose="02020603050405020304" pitchFamily="18" charset="0"/>
-            </a:endParaRPr>
-          </a:p>
-          <a:p>
-            <a:pPr>
+              <a:t>Instructions to the participant</a:t>
+            </a:r>
+          </a:p>
+          <a:p>
+            <a:pPr algn="ctr">
               <a:lnSpc>
                 <a:spcPct val="107000"/>
               </a:lnSpc>
@@ -4044,16 +4159,68 @@
                 <a:spcPts val="800"/>
               </a:spcAft>
             </a:pPr>
-            <a:r>
-              <a:rPr lang="en-GB" sz="3200" kern="100" dirty="0">
+            <a:endParaRPr lang="en-DK" sz="1400" kern="100" dirty="0">
+              <a:effectLst/>
+              <a:latin typeface="Calibri" panose="020F0502020204030204" pitchFamily="34" charset="0"/>
+              <a:ea typeface="Times New Roman" panose="02020603050405020304" pitchFamily="18" charset="0"/>
+              <a:cs typeface="Times New Roman" panose="02020603050405020304" pitchFamily="18" charset="0"/>
+            </a:endParaRPr>
+          </a:p>
+          <a:p>
+            <a:pPr algn="just">
+              <a:lnSpc>
+                <a:spcPct val="107000"/>
+              </a:lnSpc>
+              <a:spcAft>
+                <a:spcPts val="800"/>
+              </a:spcAft>
+            </a:pPr>
+            <a:r>
+              <a:rPr lang="en-GB" sz="2800" kern="100" dirty="0">
                 <a:effectLst/>
                 <a:latin typeface="Calibri" panose="020F0502020204030204" pitchFamily="34" charset="0"/>
                 <a:ea typeface="Times New Roman" panose="02020603050405020304" pitchFamily="18" charset="0"/>
                 <a:cs typeface="Times New Roman" panose="02020603050405020304" pitchFamily="18" charset="0"/>
               </a:rPr>
-              <a:t>This is a new test that is a bit different from the ones before. In this test you will feel pressure squeezes one after another. For each squeeze rate the pressure sensation as quickly as possible with the rating scale in your hand. After you rated the sensation just leave the slider where it is until you feel the next squeeze. The squeezes comes fast and there is no right or wrong answer, just provide your immediate rating of the sensation as fast as possible.</a:t>
-            </a:r>
-            <a:endParaRPr lang="en-DK" sz="1400" kern="100" dirty="0">
+              <a:t>This is a new test that is a bit different from the ones before. In this test you will feel a succession of squeezes from the cuff. </a:t>
+            </a:r>
+            <a:r>
+              <a:rPr lang="en-GB" sz="2800" b="1" kern="100" dirty="0">
+                <a:effectLst/>
+                <a:latin typeface="Calibri" panose="020F0502020204030204" pitchFamily="34" charset="0"/>
+                <a:ea typeface="Times New Roman" panose="02020603050405020304" pitchFamily="18" charset="0"/>
+                <a:cs typeface="Times New Roman" panose="02020603050405020304" pitchFamily="18" charset="0"/>
+              </a:rPr>
+              <a:t>For each squeeze, please rate your perception of pain </a:t>
+            </a:r>
+            <a:r>
+              <a:rPr lang="en-GB" sz="2800" kern="100" dirty="0">
+                <a:effectLst/>
+                <a:latin typeface="Calibri" panose="020F0502020204030204" pitchFamily="34" charset="0"/>
+                <a:ea typeface="Times New Roman" panose="02020603050405020304" pitchFamily="18" charset="0"/>
+                <a:cs typeface="Times New Roman" panose="02020603050405020304" pitchFamily="18" charset="0"/>
+              </a:rPr>
+              <a:t>(if there is any) as quickly as possible with the rating scale in your hand. After you have rated the pain just leave the slider where it is until you feel the next squeeze. The squeezes comes fast and </a:t>
+            </a:r>
+            <a:r>
+              <a:rPr lang="en-GB" sz="2800" b="1" kern="100" dirty="0">
+                <a:effectLst/>
+                <a:latin typeface="Calibri" panose="020F0502020204030204" pitchFamily="34" charset="0"/>
+                <a:ea typeface="Times New Roman" panose="02020603050405020304" pitchFamily="18" charset="0"/>
+                <a:cs typeface="Times New Roman" panose="02020603050405020304" pitchFamily="18" charset="0"/>
+              </a:rPr>
+              <a:t>there is no right or wrong answer</a:t>
+            </a:r>
+            <a:r>
+              <a:rPr lang="en-GB" sz="2800" kern="100" dirty="0">
+                <a:effectLst/>
+                <a:latin typeface="Calibri" panose="020F0502020204030204" pitchFamily="34" charset="0"/>
+                <a:ea typeface="Times New Roman" panose="02020603050405020304" pitchFamily="18" charset="0"/>
+                <a:cs typeface="Times New Roman" panose="02020603050405020304" pitchFamily="18" charset="0"/>
+              </a:rPr>
+              <a:t>, just provide your immediate rating of the pain as fast as possible.</a:t>
+            </a:r>
+            <a:endParaRPr lang="en-DK" sz="1200" kern="100" dirty="0">
               <a:effectLst/>
               <a:latin typeface="Calibri" panose="020F0502020204030204" pitchFamily="34" charset="0"/>
               <a:ea typeface="Times New Roman" panose="02020603050405020304" pitchFamily="18" charset="0"/>
@@ -4223,7 +4390,7 @@
         <p:spPr>
           <a:xfrm>
             <a:off x="916259" y="526461"/>
-            <a:ext cx="10359482" cy="5385129"/>
+            <a:ext cx="10359482" cy="5685339"/>
           </a:xfrm>
           <a:prstGeom prst="rect">
             <a:avLst/>
@@ -4301,17 +4468,11 @@
                 <a:ea typeface="Times New Roman" panose="02020603050405020304" pitchFamily="18" charset="0"/>
                 <a:cs typeface="Times New Roman" panose="02020603050405020304" pitchFamily="18" charset="0"/>
               </a:rPr>
-              <a:t>Instructions to the subject</a:t>
-            </a:r>
-            <a:endParaRPr lang="en-DK" sz="1200" kern="100" dirty="0">
-              <a:effectLst/>
-              <a:latin typeface="Calibri" panose="020F0502020204030204" pitchFamily="34" charset="0"/>
-              <a:ea typeface="Times New Roman" panose="02020603050405020304" pitchFamily="18" charset="0"/>
-              <a:cs typeface="Times New Roman" panose="02020603050405020304" pitchFamily="18" charset="0"/>
-            </a:endParaRPr>
-          </a:p>
-          <a:p>
-            <a:pPr>
+              <a:t>Instructions to the participant</a:t>
+            </a:r>
+          </a:p>
+          <a:p>
+            <a:pPr algn="ctr">
               <a:lnSpc>
                 <a:spcPct val="107000"/>
               </a:lnSpc>
@@ -4319,6 +4480,22 @@
                 <a:spcPts val="800"/>
               </a:spcAft>
             </a:pPr>
+            <a:endParaRPr lang="en-DK" sz="1200" kern="100" dirty="0">
+              <a:effectLst/>
+              <a:latin typeface="Calibri" panose="020F0502020204030204" pitchFamily="34" charset="0"/>
+              <a:ea typeface="Times New Roman" panose="02020603050405020304" pitchFamily="18" charset="0"/>
+              <a:cs typeface="Times New Roman" panose="02020603050405020304" pitchFamily="18" charset="0"/>
+            </a:endParaRPr>
+          </a:p>
+          <a:p>
+            <a:pPr algn="just">
+              <a:lnSpc>
+                <a:spcPct val="107000"/>
+              </a:lnSpc>
+              <a:spcAft>
+                <a:spcPts val="800"/>
+              </a:spcAft>
+            </a:pPr>
             <a:r>
               <a:rPr lang="en-GB" sz="2800" kern="100" dirty="0">
                 <a:effectLst/>
@@ -4326,7 +4503,7 @@
                 <a:ea typeface="Times New Roman" panose="02020603050405020304" pitchFamily="18" charset="0"/>
                 <a:cs typeface="Times New Roman" panose="02020603050405020304" pitchFamily="18" charset="0"/>
               </a:rPr>
-              <a:t>In this test you will feel an intense painful pressure squeeze on your dominant arm while the pressure on the cuff on your non-dominant leg will gradually increase. I would like you to rate the pain you feel on the non-dominant arm only with the scale in your hand. The scale goes from </a:t>
+              <a:t>In this test you will feel a continuous squeeze on your dominant leg while the pressure on the cuff on your non-dominant leg will gradually increase. I would like you to rate the pain you feel on the </a:t>
             </a:r>
             <a:r>
               <a:rPr lang="en-GB" sz="2800" b="1" kern="100" dirty="0">
@@ -4335,7 +4512,24 @@
                 <a:ea typeface="Times New Roman" panose="02020603050405020304" pitchFamily="18" charset="0"/>
                 <a:cs typeface="Times New Roman" panose="02020603050405020304" pitchFamily="18" charset="0"/>
               </a:rPr>
-              <a:t>No Pain</a:t>
+              <a:t>non-dominant </a:t>
+            </a:r>
+            <a:r>
+              <a:rPr lang="en-GB" sz="2800" b="1" kern="100" dirty="0">
+                <a:latin typeface="Calibri" panose="020F0502020204030204" pitchFamily="34" charset="0"/>
+                <a:ea typeface="Times New Roman" panose="02020603050405020304" pitchFamily="18" charset="0"/>
+                <a:cs typeface="Times New Roman" panose="02020603050405020304" pitchFamily="18" charset="0"/>
+              </a:rPr>
+              <a:t>leg</a:t>
+            </a:r>
+            <a:r>
+              <a:rPr lang="en-GB" sz="2800" b="1" kern="100" dirty="0">
+                <a:effectLst/>
+                <a:latin typeface="Calibri" panose="020F0502020204030204" pitchFamily="34" charset="0"/>
+                <a:ea typeface="Times New Roman" panose="02020603050405020304" pitchFamily="18" charset="0"/>
+                <a:cs typeface="Times New Roman" panose="02020603050405020304" pitchFamily="18" charset="0"/>
+              </a:rPr>
+              <a:t> </a:t>
             </a:r>
             <a:r>
               <a:rPr lang="en-GB" sz="2800" kern="100" dirty="0">
@@ -4344,7 +4538,7 @@
                 <a:ea typeface="Times New Roman" panose="02020603050405020304" pitchFamily="18" charset="0"/>
                 <a:cs typeface="Times New Roman" panose="02020603050405020304" pitchFamily="18" charset="0"/>
               </a:rPr>
-              <a:t> to </a:t>
+              <a:t>with the scale in your hand. The scale goes from </a:t>
             </a:r>
             <a:r>
               <a:rPr lang="en-GB" sz="2800" b="1" kern="100" dirty="0">
@@ -4353,7 +4547,7 @@
                 <a:ea typeface="Times New Roman" panose="02020603050405020304" pitchFamily="18" charset="0"/>
                 <a:cs typeface="Times New Roman" panose="02020603050405020304" pitchFamily="18" charset="0"/>
               </a:rPr>
-              <a:t>Maximal Pain</a:t>
+              <a:t>No Pain</a:t>
             </a:r>
             <a:r>
               <a:rPr lang="en-GB" sz="2800" kern="100" dirty="0">
@@ -4362,7 +4556,33 @@
                 <a:ea typeface="Times New Roman" panose="02020603050405020304" pitchFamily="18" charset="0"/>
                 <a:cs typeface="Times New Roman" panose="02020603050405020304" pitchFamily="18" charset="0"/>
               </a:rPr>
-              <a:t>. When you rate the pain, it is important that you start rating the moment you feel the slightest hint of pain. The Maximal Pain is the worst pain you can endure and when you reach this level the pressure will automatically stop.</a:t>
+              <a:t> (left) to </a:t>
+            </a:r>
+            <a:r>
+              <a:rPr lang="en-GB" sz="2800" b="1" kern="100" dirty="0">
+                <a:effectLst/>
+                <a:latin typeface="Calibri" panose="020F0502020204030204" pitchFamily="34" charset="0"/>
+                <a:ea typeface="Times New Roman" panose="02020603050405020304" pitchFamily="18" charset="0"/>
+                <a:cs typeface="Times New Roman" panose="02020603050405020304" pitchFamily="18" charset="0"/>
+              </a:rPr>
+              <a:t>Maximal Pain</a:t>
+            </a:r>
+            <a:r>
+              <a:rPr lang="en-GB" sz="2800" b="1" kern="100" dirty="0">
+                <a:latin typeface="Calibri" panose="020F0502020204030204" pitchFamily="34" charset="0"/>
+                <a:ea typeface="Times New Roman" panose="02020603050405020304" pitchFamily="18" charset="0"/>
+                <a:cs typeface="Times New Roman" panose="02020603050405020304" pitchFamily="18" charset="0"/>
+              </a:rPr>
+              <a:t> </a:t>
+            </a:r>
+            <a:r>
+              <a:rPr lang="en-GB" sz="2800" kern="100" dirty="0">
+                <a:effectLst/>
+                <a:latin typeface="Calibri" panose="020F0502020204030204" pitchFamily="34" charset="0"/>
+                <a:ea typeface="Times New Roman" panose="02020603050405020304" pitchFamily="18" charset="0"/>
+                <a:cs typeface="Times New Roman" panose="02020603050405020304" pitchFamily="18" charset="0"/>
+              </a:rPr>
+              <a:t>(right). When you rate the pain, it is important that you start rating the moment you feel the slightest hint of pain. The Maximal Pain is the worst pain you can endure and when you reach this level the pressure will automatically stop.</a:t>
             </a:r>
             <a:endParaRPr lang="en-DK" sz="1200" kern="100" dirty="0">
               <a:effectLst/>
@@ -4479,7 +4699,7 @@
                 <a:ea typeface="Calibri" panose="020F0502020204030204" pitchFamily="34" charset="0"/>
                 <a:cs typeface="Times New Roman" panose="02020603050405020304" pitchFamily="18" charset="0"/>
               </a:rPr>
-              <a:t>The researcher will give an instruction here for you to squeeze the handgrip as hard as you can for 3 seconds. </a:t>
+              <a:t>The researcher will give an instruction here for you to try and extend your knee as hard as you can for up to 5 seconds. </a:t>
             </a:r>
           </a:p>
           <a:p>
@@ -4646,7 +4866,7 @@
                 <a:ea typeface="Calibri" panose="020F0502020204030204" pitchFamily="34" charset="0"/>
                 <a:cs typeface="Times New Roman" panose="02020603050405020304" pitchFamily="18" charset="0"/>
               </a:rPr>
-              <a:t>ou will be asked to intermittently squeeze the handgrip at a fixed perceived effort of 50 - ‘hard/heavy’. </a:t>
+              <a:t>ou will be asked to intermittently extend your knee at a fixed perceived effort of 50 - ‘hard/heavy’. </a:t>
             </a:r>
           </a:p>
           <a:p>
@@ -4816,7 +5036,7 @@
                 <a:ea typeface="Calibri" panose="020F0502020204030204" pitchFamily="34" charset="0"/>
                 <a:cs typeface="Times New Roman" panose="02020603050405020304" pitchFamily="18" charset="0"/>
               </a:rPr>
-              <a:t>GO” is your prompt to contract/squeeze. </a:t>
+              <a:t>GO” is your prompt to extend/contract. </a:t>
             </a:r>
           </a:p>
           <a:p>
@@ -4887,7 +5107,7 @@
                 <a:ea typeface="Calibri" panose="020F0502020204030204" pitchFamily="34" charset="0"/>
                 <a:cs typeface="Times New Roman" panose="02020603050405020304" pitchFamily="18" charset="0"/>
               </a:rPr>
-              <a:t>Each contraction/squeeze will be for 3 seconds. </a:t>
+              <a:t>Each extension/contraction will be for 3 seconds. </a:t>
             </a:r>
           </a:p>
           <a:p>
@@ -5087,7 +5307,7 @@
                 <a:ea typeface="Calibri" panose="020F0502020204030204" pitchFamily="34" charset="0"/>
                 <a:cs typeface="Times New Roman" panose="02020603050405020304" pitchFamily="18" charset="0"/>
               </a:rPr>
-              <a:t>During this break, the researcher will ask you to provide your pain ratings for each limb on the 0-100 scale.</a:t>
+              <a:t>During this break, the researcher will ask you to provide your pain ratings for each limb on the VAS scale in your hand.</a:t>
             </a:r>
           </a:p>
           <a:p>
@@ -5122,7 +5342,24 @@
                 <a:ea typeface="Calibri" panose="020F0502020204030204" pitchFamily="34" charset="0"/>
                 <a:cs typeface="Times New Roman" panose="02020603050405020304" pitchFamily="18" charset="0"/>
               </a:rPr>
-              <a:t>You must keep your limbs (except the one which is contracting) still during the trial.</a:t>
+              <a:t>You must keep </a:t>
+            </a:r>
+            <a:r>
+              <a:rPr lang="en-GB" sz="3200" dirty="0">
+                <a:latin typeface="Outfit" pitchFamily="2" charset="0"/>
+                <a:ea typeface="Calibri" panose="020F0502020204030204" pitchFamily="34" charset="0"/>
+                <a:cs typeface="Times New Roman" panose="02020603050405020304" pitchFamily="18" charset="0"/>
+              </a:rPr>
+              <a:t>the rest of </a:t>
+            </a:r>
+            <a:r>
+              <a:rPr lang="en-GB" sz="3200" dirty="0">
+                <a:effectLst/>
+                <a:latin typeface="Outfit" pitchFamily="2" charset="0"/>
+                <a:ea typeface="Calibri" panose="020F0502020204030204" pitchFamily="34" charset="0"/>
+                <a:cs typeface="Times New Roman" panose="02020603050405020304" pitchFamily="18" charset="0"/>
+              </a:rPr>
+              <a:t>your body as still you can during the trial.</a:t>
             </a:r>
           </a:p>
         </p:txBody>

</xml_diff>